<commit_message>
Basically done coding StratoEye
</commit_message>
<xml_diff>
--- a/public/figures.pptx
+++ b/public/figures.pptx
@@ -105,6 +105,11 @@
       </a:defRPr>
     </a:lvl9pPr>
   </p:defaultTextStyle>
+  <p:extLst>
+    <p:ext uri="{EFAFB233-063F-42B5-8137-9DF3F51BA10A}">
+      <p15:sldGuideLst xmlns:p15="http://schemas.microsoft.com/office/powerpoint/2012/main"/>
+    </p:ext>
+  </p:extLst>
 </p:presentation>
 </file>
 
@@ -256,7 +261,7 @@
           <a:lstStyle/>
           <a:p>
             <a:fld id="{B3F1BBDE-6F1F-4E42-A947-1C36F4103114}" type="datetimeFigureOut">
-              <a:t>06/09/2023</a:t>
+              <a:t>09/09/2023</a:t>
             </a:fld>
             <a:endParaRPr lang="en-FR"/>
           </a:p>
@@ -454,7 +459,7 @@
           <a:lstStyle/>
           <a:p>
             <a:fld id="{B3F1BBDE-6F1F-4E42-A947-1C36F4103114}" type="datetimeFigureOut">
-              <a:t>06/09/2023</a:t>
+              <a:t>09/09/2023</a:t>
             </a:fld>
             <a:endParaRPr lang="en-FR"/>
           </a:p>
@@ -662,7 +667,7 @@
           <a:lstStyle/>
           <a:p>
             <a:fld id="{B3F1BBDE-6F1F-4E42-A947-1C36F4103114}" type="datetimeFigureOut">
-              <a:t>06/09/2023</a:t>
+              <a:t>09/09/2023</a:t>
             </a:fld>
             <a:endParaRPr lang="en-FR"/>
           </a:p>
@@ -860,7 +865,7 @@
           <a:lstStyle/>
           <a:p>
             <a:fld id="{B3F1BBDE-6F1F-4E42-A947-1C36F4103114}" type="datetimeFigureOut">
-              <a:t>06/09/2023</a:t>
+              <a:t>09/09/2023</a:t>
             </a:fld>
             <a:endParaRPr lang="en-FR"/>
           </a:p>
@@ -1134,7 +1139,7 @@
           <a:lstStyle/>
           <a:p>
             <a:fld id="{B3F1BBDE-6F1F-4E42-A947-1C36F4103114}" type="datetimeFigureOut">
-              <a:t>06/09/2023</a:t>
+              <a:t>09/09/2023</a:t>
             </a:fld>
             <a:endParaRPr lang="en-FR"/>
           </a:p>
@@ -1400,7 +1405,7 @@
           <a:lstStyle/>
           <a:p>
             <a:fld id="{B3F1BBDE-6F1F-4E42-A947-1C36F4103114}" type="datetimeFigureOut">
-              <a:t>06/09/2023</a:t>
+              <a:t>09/09/2023</a:t>
             </a:fld>
             <a:endParaRPr lang="en-FR"/>
           </a:p>
@@ -1813,7 +1818,7 @@
           <a:lstStyle/>
           <a:p>
             <a:fld id="{B3F1BBDE-6F1F-4E42-A947-1C36F4103114}" type="datetimeFigureOut">
-              <a:t>06/09/2023</a:t>
+              <a:t>09/09/2023</a:t>
             </a:fld>
             <a:endParaRPr lang="en-FR"/>
           </a:p>
@@ -1953,7 +1958,7 @@
           <a:lstStyle/>
           <a:p>
             <a:fld id="{B3F1BBDE-6F1F-4E42-A947-1C36F4103114}" type="datetimeFigureOut">
-              <a:t>06/09/2023</a:t>
+              <a:t>09/09/2023</a:t>
             </a:fld>
             <a:endParaRPr lang="en-FR"/>
           </a:p>
@@ -2064,7 +2069,7 @@
           <a:lstStyle/>
           <a:p>
             <a:fld id="{B3F1BBDE-6F1F-4E42-A947-1C36F4103114}" type="datetimeFigureOut">
-              <a:t>06/09/2023</a:t>
+              <a:t>09/09/2023</a:t>
             </a:fld>
             <a:endParaRPr lang="en-FR"/>
           </a:p>
@@ -2375,7 +2380,7 @@
           <a:lstStyle/>
           <a:p>
             <a:fld id="{B3F1BBDE-6F1F-4E42-A947-1C36F4103114}" type="datetimeFigureOut">
-              <a:t>06/09/2023</a:t>
+              <a:t>09/09/2023</a:t>
             </a:fld>
             <a:endParaRPr lang="en-FR"/>
           </a:p>
@@ -2662,7 +2667,7 @@
           <a:lstStyle/>
           <a:p>
             <a:fld id="{B3F1BBDE-6F1F-4E42-A947-1C36F4103114}" type="datetimeFigureOut">
-              <a:t>06/09/2023</a:t>
+              <a:t>09/09/2023</a:t>
             </a:fld>
             <a:endParaRPr lang="en-FR"/>
           </a:p>
@@ -2903,7 +2908,7 @@
           </a:lstStyle>
           <a:p>
             <a:fld id="{B3F1BBDE-6F1F-4E42-A947-1C36F4103114}" type="datetimeFigureOut">
-              <a:t>06/09/2023</a:t>
+              <a:t>09/09/2023</a:t>
             </a:fld>
             <a:endParaRPr lang="en-FR"/>
           </a:p>
@@ -3334,7 +3339,7 @@
         <p:spPr>
           <a:xfrm>
             <a:off x="2329857" y="687744"/>
-            <a:ext cx="2414444" cy="830997"/>
+            <a:ext cx="2457724" cy="830997"/>
           </a:xfrm>
           <a:prstGeom prst="rect">
             <a:avLst/>
@@ -3356,7 +3361,7 @@
                 <a:ea typeface="SF Pro Compressed Black" pitchFamily="2" charset="0"/>
                 <a:cs typeface="SF Pro Compressed Black" pitchFamily="2" charset="0"/>
               </a:rPr>
-              <a:t>ChatATC</a:t>
+              <a:t>StratoEye</a:t>
             </a:r>
             <a:endParaRPr lang="en-FR" sz="5400" b="1">
               <a:solidFill>
@@ -3543,7 +3548,7 @@
         </p:nvSpPr>
         <p:spPr>
           <a:xfrm>
-            <a:off x="3307496" y="1326657"/>
+            <a:off x="3368852" y="1389331"/>
             <a:ext cx="1380506" cy="369332"/>
           </a:xfrm>
           <a:prstGeom prst="rect">

</xml_diff>